<commit_message>
MEPD v3 corrected after Dupraz reading
Changement complet de la description du feedback cooling
Les figures sont corrigées ainsi que leur légende
La plupart du texte a été finement ajustée
</commit_message>
<xml_diff>
--- a/MEPD/figures/resizer.pptx
+++ b/MEPD/figures/resizer.pptx
@@ -9,6 +9,7 @@
     <p:sldId id="257" r:id="rId3"/>
     <p:sldId id="258" r:id="rId4"/>
     <p:sldId id="259" r:id="rId5"/>
+    <p:sldId id="260" r:id="rId6"/>
   </p:sldIdLst>
   <p:sldSz cx="12192000" cy="6858000"/>
   <p:notesSz cx="6858000" cy="9144000"/>
@@ -246,7 +247,7 @@
           <a:p>
             <a:fld id="{ADA3ECA2-D469-47A9-A060-ED01498D0599}" type="datetimeFigureOut">
               <a:rPr lang="fr-FR" smtClean="0"/>
-              <a:t>03/01/2020</a:t>
+              <a:t>25/03/2020</a:t>
             </a:fld>
             <a:endParaRPr lang="fr-FR"/>
           </a:p>
@@ -416,7 +417,7 @@
           <a:p>
             <a:fld id="{ADA3ECA2-D469-47A9-A060-ED01498D0599}" type="datetimeFigureOut">
               <a:rPr lang="fr-FR" smtClean="0"/>
-              <a:t>03/01/2020</a:t>
+              <a:t>25/03/2020</a:t>
             </a:fld>
             <a:endParaRPr lang="fr-FR"/>
           </a:p>
@@ -596,7 +597,7 @@
           <a:p>
             <a:fld id="{ADA3ECA2-D469-47A9-A060-ED01498D0599}" type="datetimeFigureOut">
               <a:rPr lang="fr-FR" smtClean="0"/>
-              <a:t>03/01/2020</a:t>
+              <a:t>25/03/2020</a:t>
             </a:fld>
             <a:endParaRPr lang="fr-FR"/>
           </a:p>
@@ -766,7 +767,7 @@
           <a:p>
             <a:fld id="{ADA3ECA2-D469-47A9-A060-ED01498D0599}" type="datetimeFigureOut">
               <a:rPr lang="fr-FR" smtClean="0"/>
-              <a:t>03/01/2020</a:t>
+              <a:t>25/03/2020</a:t>
             </a:fld>
             <a:endParaRPr lang="fr-FR"/>
           </a:p>
@@ -1012,7 +1013,7 @@
           <a:p>
             <a:fld id="{ADA3ECA2-D469-47A9-A060-ED01498D0599}" type="datetimeFigureOut">
               <a:rPr lang="fr-FR" smtClean="0"/>
-              <a:t>03/01/2020</a:t>
+              <a:t>25/03/2020</a:t>
             </a:fld>
             <a:endParaRPr lang="fr-FR"/>
           </a:p>
@@ -1244,7 +1245,7 @@
           <a:p>
             <a:fld id="{ADA3ECA2-D469-47A9-A060-ED01498D0599}" type="datetimeFigureOut">
               <a:rPr lang="fr-FR" smtClean="0"/>
-              <a:t>03/01/2020</a:t>
+              <a:t>25/03/2020</a:t>
             </a:fld>
             <a:endParaRPr lang="fr-FR"/>
           </a:p>
@@ -1611,7 +1612,7 @@
           <a:p>
             <a:fld id="{ADA3ECA2-D469-47A9-A060-ED01498D0599}" type="datetimeFigureOut">
               <a:rPr lang="fr-FR" smtClean="0"/>
-              <a:t>03/01/2020</a:t>
+              <a:t>25/03/2020</a:t>
             </a:fld>
             <a:endParaRPr lang="fr-FR"/>
           </a:p>
@@ -1729,7 +1730,7 @@
           <a:p>
             <a:fld id="{ADA3ECA2-D469-47A9-A060-ED01498D0599}" type="datetimeFigureOut">
               <a:rPr lang="fr-FR" smtClean="0"/>
-              <a:t>03/01/2020</a:t>
+              <a:t>25/03/2020</a:t>
             </a:fld>
             <a:endParaRPr lang="fr-FR"/>
           </a:p>
@@ -1824,7 +1825,7 @@
           <a:p>
             <a:fld id="{ADA3ECA2-D469-47A9-A060-ED01498D0599}" type="datetimeFigureOut">
               <a:rPr lang="fr-FR" smtClean="0"/>
-              <a:t>03/01/2020</a:t>
+              <a:t>25/03/2020</a:t>
             </a:fld>
             <a:endParaRPr lang="fr-FR"/>
           </a:p>
@@ -2101,7 +2102,7 @@
           <a:p>
             <a:fld id="{ADA3ECA2-D469-47A9-A060-ED01498D0599}" type="datetimeFigureOut">
               <a:rPr lang="fr-FR" smtClean="0"/>
-              <a:t>03/01/2020</a:t>
+              <a:t>25/03/2020</a:t>
             </a:fld>
             <a:endParaRPr lang="fr-FR"/>
           </a:p>
@@ -2354,7 +2355,7 @@
           <a:p>
             <a:fld id="{ADA3ECA2-D469-47A9-A060-ED01498D0599}" type="datetimeFigureOut">
               <a:rPr lang="fr-FR" smtClean="0"/>
-              <a:t>03/01/2020</a:t>
+              <a:t>25/03/2020</a:t>
             </a:fld>
             <a:endParaRPr lang="fr-FR"/>
           </a:p>
@@ -2567,7 +2568,7 @@
           <a:p>
             <a:fld id="{ADA3ECA2-D469-47A9-A060-ED01498D0599}" type="datetimeFigureOut">
               <a:rPr lang="fr-FR" smtClean="0"/>
-              <a:t>03/01/2020</a:t>
+              <a:t>25/03/2020</a:t>
             </a:fld>
             <a:endParaRPr lang="fr-FR"/>
           </a:p>
@@ -3151,13 +3152,13 @@
               </a:ext>
             </a:extLst>
           </a:blip>
-          <a:srcRect l="28108" t="32211" r="38086" b="47723"/>
+          <a:srcRect l="28108" t="32211" r="38086" b="48383"/>
           <a:stretch/>
         </p:blipFill>
         <p:spPr>
           <a:xfrm>
-            <a:off x="5911913" y="2272421"/>
-            <a:ext cx="1738266" cy="1376126"/>
+            <a:off x="3476542" y="1149786"/>
+            <a:ext cx="4183090" cy="3202674"/>
           </a:xfrm>
           <a:prstGeom prst="rect">
             <a:avLst/>
@@ -3180,19 +3181,147 @@
               </a:ext>
             </a:extLst>
           </a:blip>
-          <a:srcRect l="4862" t="25742" r="16433" b="17492"/>
+          <a:srcRect l="7855" t="25610" r="18546" b="22640"/>
           <a:stretch/>
         </p:blipFill>
         <p:spPr>
           <a:xfrm>
-            <a:off x="1204111" y="1910281"/>
-            <a:ext cx="4046899" cy="3892990"/>
+            <a:off x="0" y="1151611"/>
+            <a:ext cx="3413156" cy="3200854"/>
           </a:xfrm>
           <a:prstGeom prst="rect">
             <a:avLst/>
           </a:prstGeom>
         </p:spPr>
       </p:pic>
+      <p:pic>
+        <p:nvPicPr>
+          <p:cNvPr id="2" name="Image 1"/>
+          <p:cNvPicPr>
+            <a:picLocks noChangeAspect="1"/>
+          </p:cNvPicPr>
+          <p:nvPr/>
+        </p:nvPicPr>
+        <p:blipFill>
+          <a:blip r:embed="rId4" cstate="print">
+            <a:extLst>
+              <a:ext uri="{28A0092B-C50C-407E-A947-70E740481C1C}">
+                <a14:useLocalDpi xmlns:a14="http://schemas.microsoft.com/office/drawing/2010/main" val="0"/>
+              </a:ext>
+            </a:extLst>
+          </a:blip>
+          <a:stretch>
+            <a:fillRect/>
+          </a:stretch>
+        </p:blipFill>
+        <p:spPr>
+          <a:xfrm>
+            <a:off x="7723018" y="1149785"/>
+            <a:ext cx="4270232" cy="3202674"/>
+          </a:xfrm>
+          <a:prstGeom prst="rect">
+            <a:avLst/>
+          </a:prstGeom>
+        </p:spPr>
+      </p:pic>
+      <p:sp>
+        <p:nvSpPr>
+          <p:cNvPr id="3" name="ZoneTexte 2"/>
+          <p:cNvSpPr txBox="1"/>
+          <p:nvPr/>
+        </p:nvSpPr>
+        <p:spPr>
+          <a:xfrm>
+            <a:off x="0" y="1149791"/>
+            <a:ext cx="545342" cy="646331"/>
+          </a:xfrm>
+          <a:prstGeom prst="rect">
+            <a:avLst/>
+          </a:prstGeom>
+          <a:noFill/>
+        </p:spPr>
+        <p:txBody>
+          <a:bodyPr wrap="none" rtlCol="0">
+            <a:spAutoFit/>
+          </a:bodyPr>
+          <a:lstStyle/>
+          <a:p>
+            <a:r>
+              <a:rPr lang="fr-FR" sz="3600" dirty="0" smtClean="0"/>
+              <a:t>a)</a:t>
+            </a:r>
+            <a:endParaRPr lang="fr-FR" sz="3600" dirty="0"/>
+          </a:p>
+        </p:txBody>
+      </p:sp>
+      <p:sp>
+        <p:nvSpPr>
+          <p:cNvPr id="6" name="ZoneTexte 5"/>
+          <p:cNvSpPr txBox="1"/>
+          <p:nvPr/>
+        </p:nvSpPr>
+        <p:spPr>
+          <a:xfrm>
+            <a:off x="3476542" y="1149785"/>
+            <a:ext cx="566181" cy="646331"/>
+          </a:xfrm>
+          <a:prstGeom prst="rect">
+            <a:avLst/>
+          </a:prstGeom>
+          <a:noFill/>
+        </p:spPr>
+        <p:txBody>
+          <a:bodyPr wrap="none" rtlCol="0">
+            <a:spAutoFit/>
+          </a:bodyPr>
+          <a:lstStyle/>
+          <a:p>
+            <a:r>
+              <a:rPr lang="fr-FR" sz="3600" dirty="0" smtClean="0"/>
+              <a:t>b)</a:t>
+            </a:r>
+            <a:endParaRPr lang="fr-FR" sz="3600" dirty="0"/>
+          </a:p>
+        </p:txBody>
+      </p:sp>
+      <p:sp>
+        <p:nvSpPr>
+          <p:cNvPr id="7" name="ZoneTexte 6"/>
+          <p:cNvSpPr txBox="1"/>
+          <p:nvPr/>
+        </p:nvSpPr>
+        <p:spPr>
+          <a:xfrm>
+            <a:off x="7723018" y="1149783"/>
+            <a:ext cx="519694" cy="646331"/>
+          </a:xfrm>
+          <a:prstGeom prst="rect">
+            <a:avLst/>
+          </a:prstGeom>
+          <a:noFill/>
+        </p:spPr>
+        <p:txBody>
+          <a:bodyPr wrap="none" rtlCol="0">
+            <a:spAutoFit/>
+          </a:bodyPr>
+          <a:lstStyle/>
+          <a:p>
+            <a:r>
+              <a:rPr lang="fr-FR" sz="3600" dirty="0" smtClean="0">
+                <a:solidFill>
+                  <a:schemeClr val="bg1"/>
+                </a:solidFill>
+              </a:rPr>
+              <a:t>c)</a:t>
+            </a:r>
+            <a:endParaRPr lang="fr-FR" sz="3600" dirty="0">
+              <a:solidFill>
+                <a:schemeClr val="bg1"/>
+              </a:solidFill>
+            </a:endParaRPr>
+          </a:p>
+        </p:txBody>
+      </p:sp>
     </p:spTree>
     <p:extLst>
       <p:ext uri="{BB962C8B-B14F-4D97-AF65-F5344CB8AC3E}">
@@ -3383,6 +3512,251 @@
   <p:clrMapOvr>
     <a:masterClrMapping/>
   </p:clrMapOvr>
+</p:sld>
+</file>
+
+<file path=ppt/slides/slide5.xml><?xml version="1.0" encoding="utf-8"?>
+<p:sld xmlns:a="http://schemas.openxmlformats.org/drawingml/2006/main" xmlns:r="http://schemas.openxmlformats.org/officeDocument/2006/relationships" xmlns:p="http://schemas.openxmlformats.org/presentationml/2006/main">
+  <p:cSld>
+    <p:spTree>
+      <p:nvGrpSpPr>
+        <p:cNvPr id="1" name=""/>
+        <p:cNvGrpSpPr/>
+        <p:nvPr/>
+      </p:nvGrpSpPr>
+      <p:grpSpPr>
+        <a:xfrm>
+          <a:off x="0" y="0"/>
+          <a:ext cx="0" cy="0"/>
+          <a:chOff x="0" y="0"/>
+          <a:chExt cx="0" cy="0"/>
+        </a:xfrm>
+      </p:grpSpPr>
+      <p:pic>
+        <p:nvPicPr>
+          <p:cNvPr id="4" name="Picture 2" descr="ImageMRFM"/>
+          <p:cNvPicPr>
+            <a:picLocks noChangeAspect="1" noChangeArrowheads="1"/>
+          </p:cNvPicPr>
+          <p:nvPr/>
+        </p:nvPicPr>
+        <p:blipFill>
+          <a:blip r:embed="rId2">
+            <a:extLst>
+              <a:ext uri="{28A0092B-C50C-407E-A947-70E740481C1C}">
+                <a14:useLocalDpi xmlns:a14="http://schemas.microsoft.com/office/drawing/2010/main" val="0"/>
+              </a:ext>
+            </a:extLst>
+          </a:blip>
+          <a:srcRect/>
+          <a:stretch>
+            <a:fillRect/>
+          </a:stretch>
+        </p:blipFill>
+        <p:spPr bwMode="auto">
+          <a:xfrm>
+            <a:off x="0" y="1022237"/>
+            <a:ext cx="3083751" cy="2424228"/>
+          </a:xfrm>
+          <a:prstGeom prst="rect">
+            <a:avLst/>
+          </a:prstGeom>
+          <a:noFill/>
+          <a:ln>
+            <a:noFill/>
+          </a:ln>
+          <a:effectLst/>
+          <a:extLst>
+            <a:ext uri="{909E8E84-426E-40DD-AFC4-6F175D3DCCD1}">
+              <a14:hiddenFill xmlns:a14="http://schemas.microsoft.com/office/drawing/2010/main">
+                <a:solidFill>
+                  <a:srgbClr val="FFFFFF"/>
+                </a:solidFill>
+              </a14:hiddenFill>
+            </a:ext>
+            <a:ext uri="{91240B29-F687-4F45-9708-019B960494DF}">
+              <a14:hiddenLine xmlns:a14="http://schemas.microsoft.com/office/drawing/2010/main" w="9525">
+                <a:solidFill>
+                  <a:srgbClr val="000000"/>
+                </a:solidFill>
+                <a:miter lim="800000"/>
+                <a:headEnd/>
+                <a:tailEnd/>
+              </a14:hiddenLine>
+            </a:ext>
+          </a:extLst>
+        </p:spPr>
+      </p:pic>
+      <p:pic>
+        <p:nvPicPr>
+          <p:cNvPr id="5" name="Picture 3"/>
+          <p:cNvPicPr>
+            <a:picLocks noChangeAspect="1" noChangeArrowheads="1"/>
+          </p:cNvPicPr>
+          <p:nvPr/>
+        </p:nvPicPr>
+        <p:blipFill>
+          <a:blip r:embed="rId3">
+            <a:extLst>
+              <a:ext uri="{28A0092B-C50C-407E-A947-70E740481C1C}">
+                <a14:useLocalDpi xmlns:a14="http://schemas.microsoft.com/office/drawing/2010/main" val="0"/>
+              </a:ext>
+            </a:extLst>
+          </a:blip>
+          <a:srcRect/>
+          <a:stretch>
+            <a:fillRect/>
+          </a:stretch>
+        </p:blipFill>
+        <p:spPr bwMode="auto">
+          <a:xfrm>
+            <a:off x="5856519" y="325120"/>
+            <a:ext cx="3634234" cy="2424228"/>
+          </a:xfrm>
+          <a:prstGeom prst="rect">
+            <a:avLst/>
+          </a:prstGeom>
+          <a:noFill/>
+          <a:ln>
+            <a:noFill/>
+          </a:ln>
+          <a:effectLst/>
+          <a:extLst>
+            <a:ext uri="{909E8E84-426E-40DD-AFC4-6F175D3DCCD1}">
+              <a14:hiddenFill xmlns:a14="http://schemas.microsoft.com/office/drawing/2010/main">
+                <a:solidFill>
+                  <a:srgbClr val="FFFFFF"/>
+                </a:solidFill>
+              </a14:hiddenFill>
+            </a:ext>
+            <a:ext uri="{91240B29-F687-4F45-9708-019B960494DF}">
+              <a14:hiddenLine xmlns:a14="http://schemas.microsoft.com/office/drawing/2010/main" w="9525">
+                <a:solidFill>
+                  <a:srgbClr val="000000"/>
+                </a:solidFill>
+                <a:miter lim="800000"/>
+                <a:headEnd/>
+                <a:tailEnd/>
+              </a14:hiddenLine>
+            </a:ext>
+          </a:extLst>
+        </p:spPr>
+      </p:pic>
+      <p:pic>
+        <p:nvPicPr>
+          <p:cNvPr id="6" name="Image 5"/>
+          <p:cNvPicPr>
+            <a:picLocks noChangeAspect="1"/>
+          </p:cNvPicPr>
+          <p:nvPr/>
+        </p:nvPicPr>
+        <p:blipFill rotWithShape="1">
+          <a:blip r:embed="rId4">
+            <a:extLst>
+              <a:ext uri="{28A0092B-C50C-407E-A947-70E740481C1C}">
+                <a14:useLocalDpi xmlns:a14="http://schemas.microsoft.com/office/drawing/2010/main" val="0"/>
+              </a:ext>
+            </a:extLst>
+          </a:blip>
+          <a:srcRect t="11029" b="19952"/>
+          <a:stretch/>
+        </p:blipFill>
+        <p:spPr>
+          <a:xfrm>
+            <a:off x="3001327" y="3312126"/>
+            <a:ext cx="6711339" cy="2649581"/>
+          </a:xfrm>
+          <a:prstGeom prst="rect">
+            <a:avLst/>
+          </a:prstGeom>
+          <a:effectLst/>
+        </p:spPr>
+      </p:pic>
+    </p:spTree>
+    <p:extLst>
+      <p:ext uri="{BB962C8B-B14F-4D97-AF65-F5344CB8AC3E}">
+        <p14:creationId xmlns:p14="http://schemas.microsoft.com/office/powerpoint/2010/main" val="3285568150"/>
+      </p:ext>
+    </p:extLst>
+  </p:cSld>
+  <p:clrMapOvr>
+    <a:masterClrMapping/>
+  </p:clrMapOvr>
+  <p:timing>
+    <p:tnLst>
+      <p:par>
+        <p:cTn id="1" dur="indefinite" restart="never" nodeType="tmRoot">
+          <p:childTnLst>
+            <p:seq concurrent="1" nextAc="seek">
+              <p:cTn id="2" dur="indefinite" nodeType="mainSeq">
+                <p:childTnLst>
+                  <p:par>
+                    <p:cTn id="3" fill="hold">
+                      <p:stCondLst>
+                        <p:cond delay="indefinite"/>
+                      </p:stCondLst>
+                      <p:childTnLst>
+                        <p:par>
+                          <p:cTn id="4" fill="hold">
+                            <p:stCondLst>
+                              <p:cond delay="0"/>
+                            </p:stCondLst>
+                            <p:childTnLst>
+                              <p:par>
+                                <p:cTn id="5" presetID="1" presetClass="entr" presetSubtype="0" fill="hold" nodeType="clickEffect">
+                                  <p:stCondLst>
+                                    <p:cond delay="0"/>
+                                  </p:stCondLst>
+                                  <p:childTnLst>
+                                    <p:set>
+                                      <p:cBhvr>
+                                        <p:cTn id="6" dur="1" fill="hold">
+                                          <p:stCondLst>
+                                            <p:cond delay="0"/>
+                                          </p:stCondLst>
+                                        </p:cTn>
+                                        <p:tgtEl>
+                                          <p:spTgt spid="6"/>
+                                        </p:tgtEl>
+                                        <p:attrNameLst>
+                                          <p:attrName>style.visibility</p:attrName>
+                                        </p:attrNameLst>
+                                      </p:cBhvr>
+                                      <p:to>
+                                        <p:strVal val="visible"/>
+                                      </p:to>
+                                    </p:set>
+                                  </p:childTnLst>
+                                </p:cTn>
+                              </p:par>
+                            </p:childTnLst>
+                          </p:cTn>
+                        </p:par>
+                      </p:childTnLst>
+                    </p:cTn>
+                  </p:par>
+                </p:childTnLst>
+              </p:cTn>
+              <p:prevCondLst>
+                <p:cond evt="onPrev" delay="0">
+                  <p:tgtEl>
+                    <p:sldTgt/>
+                  </p:tgtEl>
+                </p:cond>
+              </p:prevCondLst>
+              <p:nextCondLst>
+                <p:cond evt="onNext" delay="0">
+                  <p:tgtEl>
+                    <p:sldTgt/>
+                  </p:tgtEl>
+                </p:cond>
+              </p:nextCondLst>
+            </p:seq>
+          </p:childTnLst>
+        </p:cTn>
+      </p:par>
+    </p:tnLst>
+  </p:timing>
 </p:sld>
 </file>
 

</xml_diff>